<commit_message>
nearly complete plan and slides for second part of lesson 1
</commit_message>
<xml_diff>
--- a/UM_DataManagementClass/Lessons/01/01_secondMeeting.pptx
+++ b/UM_DataManagementClass/Lessons/01/01_secondMeeting.pptx
@@ -7,7 +7,7 @@
     <p:sldMasterId id="2147483962" r:id="rId3"/>
   </p:sldMasterIdLst>
   <p:notesMasterIdLst>
-    <p:notesMasterId r:id="rId23"/>
+    <p:notesMasterId r:id="rId33"/>
   </p:notesMasterIdLst>
   <p:sldIdLst>
     <p:sldId id="256" r:id="rId4"/>
@@ -20,15 +20,25 @@
     <p:sldId id="295" r:id="rId11"/>
     <p:sldId id="296" r:id="rId12"/>
     <p:sldId id="299" r:id="rId13"/>
-    <p:sldId id="303" r:id="rId14"/>
-    <p:sldId id="273" r:id="rId15"/>
-    <p:sldId id="274" r:id="rId16"/>
-    <p:sldId id="263" r:id="rId17"/>
-    <p:sldId id="264" r:id="rId18"/>
-    <p:sldId id="265" r:id="rId19"/>
-    <p:sldId id="266" r:id="rId20"/>
-    <p:sldId id="267" r:id="rId21"/>
-    <p:sldId id="302" r:id="rId22"/>
+    <p:sldId id="306" r:id="rId14"/>
+    <p:sldId id="303" r:id="rId15"/>
+    <p:sldId id="314" r:id="rId16"/>
+    <p:sldId id="315" r:id="rId17"/>
+    <p:sldId id="313" r:id="rId18"/>
+    <p:sldId id="307" r:id="rId19"/>
+    <p:sldId id="309" r:id="rId20"/>
+    <p:sldId id="310" r:id="rId21"/>
+    <p:sldId id="311" r:id="rId22"/>
+    <p:sldId id="312" r:id="rId23"/>
+    <p:sldId id="305" r:id="rId24"/>
+    <p:sldId id="273" r:id="rId25"/>
+    <p:sldId id="274" r:id="rId26"/>
+    <p:sldId id="263" r:id="rId27"/>
+    <p:sldId id="264" r:id="rId28"/>
+    <p:sldId id="265" r:id="rId29"/>
+    <p:sldId id="266" r:id="rId30"/>
+    <p:sldId id="267" r:id="rId31"/>
+    <p:sldId id="302" r:id="rId32"/>
   </p:sldIdLst>
   <p:sldSz cx="12192000" cy="6858000"/>
   <p:notesSz cx="7010400" cy="9296400"/>
@@ -537,7 +547,7 @@
           </a:ln>
           <a:extLst>
             <a:ext uri="{909E8E84-426E-40dd-AFC4-6F175D3DCCD1}">
-              <a14:hiddenFill xmlns="" xmlns:a14="http://schemas.microsoft.com/office/drawing/2010/main">
+              <a14:hiddenFill xmlns:a14="http://schemas.microsoft.com/office/drawing/2010/main" xmlns="">
                 <a:solidFill>
                   <a:srgbClr val="FFFFFF"/>
                 </a:solidFill>
@@ -560,14 +570,14 @@
           <a:noFill/>
           <a:extLst>
             <a:ext uri="{909E8E84-426E-40dd-AFC4-6F175D3DCCD1}">
-              <a14:hiddenFill xmlns="" xmlns:a14="http://schemas.microsoft.com/office/drawing/2010/main">
+              <a14:hiddenFill xmlns:a14="http://schemas.microsoft.com/office/drawing/2010/main" xmlns="">
                 <a:solidFill>
                   <a:srgbClr val="FFFFFF"/>
                 </a:solidFill>
               </a14:hiddenFill>
             </a:ext>
             <a:ext uri="{91240B29-F687-4f45-9708-019B960494DF}">
-              <a14:hiddenLine xmlns="" xmlns:a14="http://schemas.microsoft.com/office/drawing/2010/main" w="9525">
+              <a14:hiddenLine xmlns:a14="http://schemas.microsoft.com/office/drawing/2010/main" xmlns="" w="9525">
                 <a:solidFill>
                   <a:srgbClr val="000000"/>
                 </a:solidFill>
@@ -679,14 +689,14 @@
           <a:noFill/>
           <a:extLst>
             <a:ext uri="{909E8E84-426E-40dd-AFC4-6F175D3DCCD1}">
-              <a14:hiddenFill xmlns="" xmlns:a14="http://schemas.microsoft.com/office/drawing/2010/main">
+              <a14:hiddenFill xmlns:a14="http://schemas.microsoft.com/office/drawing/2010/main" xmlns="">
                 <a:solidFill>
                   <a:srgbClr val="FFFFFF"/>
                 </a:solidFill>
               </a14:hiddenFill>
             </a:ext>
             <a:ext uri="{91240B29-F687-4f45-9708-019B960494DF}">
-              <a14:hiddenLine xmlns="" xmlns:a14="http://schemas.microsoft.com/office/drawing/2010/main" w="9525">
+              <a14:hiddenLine xmlns:a14="http://schemas.microsoft.com/office/drawing/2010/main" xmlns="" w="9525">
                 <a:solidFill>
                   <a:srgbClr val="000000"/>
                 </a:solidFill>
@@ -1078,7 +1088,7 @@
                 </a:solidFill>
               </a:rPr>
               <a:pPr/>
-              <a:t>14</a:t>
+              <a:t>24</a:t>
             </a:fld>
             <a:endParaRPr lang="en-US">
               <a:solidFill>
@@ -1337,7 +1347,7 @@
                 </a:solidFill>
               </a:rPr>
               <a:pPr/>
-              <a:t>15</a:t>
+              <a:t>25</a:t>
             </a:fld>
             <a:endParaRPr lang="en-US">
               <a:solidFill>
@@ -1596,7 +1606,7 @@
                 </a:solidFill>
               </a:rPr>
               <a:pPr/>
-              <a:t>16</a:t>
+              <a:t>26</a:t>
             </a:fld>
             <a:endParaRPr lang="en-US">
               <a:solidFill>
@@ -1855,7 +1865,7 @@
                 </a:solidFill>
               </a:rPr>
               <a:pPr/>
-              <a:t>17</a:t>
+              <a:t>27</a:t>
             </a:fld>
             <a:endParaRPr lang="en-US">
               <a:solidFill>
@@ -2114,7 +2124,7 @@
                 </a:solidFill>
               </a:rPr>
               <a:pPr/>
-              <a:t>18</a:t>
+              <a:t>28</a:t>
             </a:fld>
             <a:endParaRPr lang="en-US">
               <a:solidFill>
@@ -2176,7 +2186,7 @@
           </a:ln>
           <a:extLst>
             <a:ext uri="{909E8E84-426E-40dd-AFC4-6F175D3DCCD1}">
-              <a14:hiddenFill xmlns="" xmlns:a14="http://schemas.microsoft.com/office/drawing/2010/main">
+              <a14:hiddenFill xmlns:a14="http://schemas.microsoft.com/office/drawing/2010/main" xmlns="">
                 <a:solidFill>
                   <a:srgbClr val="FFFFFF"/>
                 </a:solidFill>
@@ -2199,14 +2209,14 @@
           <a:noFill/>
           <a:extLst>
             <a:ext uri="{909E8E84-426E-40dd-AFC4-6F175D3DCCD1}">
-              <a14:hiddenFill xmlns="" xmlns:a14="http://schemas.microsoft.com/office/drawing/2010/main">
+              <a14:hiddenFill xmlns:a14="http://schemas.microsoft.com/office/drawing/2010/main" xmlns="">
                 <a:solidFill>
                   <a:srgbClr val="FFFFFF"/>
                 </a:solidFill>
               </a14:hiddenFill>
             </a:ext>
             <a:ext uri="{91240B29-F687-4f45-9708-019B960494DF}">
-              <a14:hiddenLine xmlns="" xmlns:a14="http://schemas.microsoft.com/office/drawing/2010/main" w="9525">
+              <a14:hiddenLine xmlns:a14="http://schemas.microsoft.com/office/drawing/2010/main" xmlns="" w="9525">
                 <a:solidFill>
                   <a:srgbClr val="000000"/>
                 </a:solidFill>
@@ -2309,14 +2319,14 @@
           <a:noFill/>
           <a:extLst>
             <a:ext uri="{909E8E84-426E-40dd-AFC4-6F175D3DCCD1}">
-              <a14:hiddenFill xmlns="" xmlns:a14="http://schemas.microsoft.com/office/drawing/2010/main">
+              <a14:hiddenFill xmlns:a14="http://schemas.microsoft.com/office/drawing/2010/main" xmlns="">
                 <a:solidFill>
                   <a:srgbClr val="FFFFFF"/>
                 </a:solidFill>
               </a14:hiddenFill>
             </a:ext>
             <a:ext uri="{91240B29-F687-4f45-9708-019B960494DF}">
-              <a14:hiddenLine xmlns="" xmlns:a14="http://schemas.microsoft.com/office/drawing/2010/main" w="9525">
+              <a14:hiddenLine xmlns:a14="http://schemas.microsoft.com/office/drawing/2010/main" xmlns="" w="9525">
                 <a:solidFill>
                   <a:srgbClr val="000000"/>
                 </a:solidFill>
@@ -2511,7 +2521,7 @@
           </a:ln>
           <a:extLst>
             <a:ext uri="{909E8E84-426E-40dd-AFC4-6F175D3DCCD1}">
-              <a14:hiddenFill xmlns="" xmlns:a14="http://schemas.microsoft.com/office/drawing/2010/main">
+              <a14:hiddenFill xmlns:a14="http://schemas.microsoft.com/office/drawing/2010/main" xmlns="">
                 <a:solidFill>
                   <a:srgbClr val="FFFFFF"/>
                 </a:solidFill>
@@ -2534,14 +2544,14 @@
           <a:noFill/>
           <a:extLst>
             <a:ext uri="{909E8E84-426E-40dd-AFC4-6F175D3DCCD1}">
-              <a14:hiddenFill xmlns="" xmlns:a14="http://schemas.microsoft.com/office/drawing/2010/main">
+              <a14:hiddenFill xmlns:a14="http://schemas.microsoft.com/office/drawing/2010/main" xmlns="">
                 <a:solidFill>
                   <a:srgbClr val="FFFFFF"/>
                 </a:solidFill>
               </a14:hiddenFill>
             </a:ext>
             <a:ext uri="{91240B29-F687-4f45-9708-019B960494DF}">
-              <a14:hiddenLine xmlns="" xmlns:a14="http://schemas.microsoft.com/office/drawing/2010/main" w="9525">
+              <a14:hiddenLine xmlns:a14="http://schemas.microsoft.com/office/drawing/2010/main" xmlns="" w="9525">
                 <a:solidFill>
                   <a:srgbClr val="000000"/>
                 </a:solidFill>
@@ -2687,14 +2697,14 @@
           <a:noFill/>
           <a:extLst>
             <a:ext uri="{909E8E84-426E-40dd-AFC4-6F175D3DCCD1}">
-              <a14:hiddenFill xmlns="" xmlns:a14="http://schemas.microsoft.com/office/drawing/2010/main">
+              <a14:hiddenFill xmlns:a14="http://schemas.microsoft.com/office/drawing/2010/main" xmlns="">
                 <a:solidFill>
                   <a:srgbClr val="FFFFFF"/>
                 </a:solidFill>
               </a14:hiddenFill>
             </a:ext>
             <a:ext uri="{91240B29-F687-4f45-9708-019B960494DF}">
-              <a14:hiddenLine xmlns="" xmlns:a14="http://schemas.microsoft.com/office/drawing/2010/main" w="9525">
+              <a14:hiddenLine xmlns:a14="http://schemas.microsoft.com/office/drawing/2010/main" xmlns="" w="9525">
                 <a:solidFill>
                   <a:srgbClr val="000000"/>
                 </a:solidFill>
@@ -3517,7 +3527,7 @@
             <a:fld id="{9EC847EA-B926-5749-9EF7-DA980FF2A6CA}" type="slidenum">
               <a:rPr lang="en-US" smtClean="0"/>
               <a:pPr/>
-              <a:t>12</a:t>
+              <a:t>22</a:t>
             </a:fld>
             <a:endParaRPr lang="en-US"/>
           </a:p>
@@ -3610,7 +3620,7 @@
             <a:fld id="{9EC847EA-B926-5749-9EF7-DA980FF2A6CA}" type="slidenum">
               <a:rPr lang="en-US" smtClean="0"/>
               <a:pPr/>
-              <a:t>13</a:t>
+              <a:t>23</a:t>
             </a:fld>
             <a:endParaRPr lang="en-US"/>
           </a:p>
@@ -14955,14 +14965,14 @@
           </a:ln>
           <a:extLst>
             <a:ext uri="{909E8E84-426E-40dd-AFC4-6F175D3DCCD1}">
-              <a14:hiddenFill xmlns="" xmlns:a14="http://schemas.microsoft.com/office/drawing/2010/main">
+              <a14:hiddenFill xmlns:a14="http://schemas.microsoft.com/office/drawing/2010/main" xmlns="">
                 <a:solidFill>
                   <a:srgbClr val="FFFFFF"/>
                 </a:solidFill>
               </a14:hiddenFill>
             </a:ext>
             <a:ext uri="{91240B29-F687-4f45-9708-019B960494DF}">
-              <a14:hiddenLine xmlns="" xmlns:a14="http://schemas.microsoft.com/office/drawing/2010/main" w="9525">
+              <a14:hiddenLine xmlns:a14="http://schemas.microsoft.com/office/drawing/2010/main" xmlns="" w="9525">
                 <a:solidFill>
                   <a:srgbClr val="000000"/>
                 </a:solidFill>
@@ -16808,6 +16818,78 @@
       </p:grpSpPr>
       <p:sp>
         <p:nvSpPr>
+          <p:cNvPr id="2" name="Title 1"/>
+          <p:cNvSpPr>
+            <a:spLocks noGrp="1"/>
+          </p:cNvSpPr>
+          <p:nvPr>
+            <p:ph type="title"/>
+          </p:nvPr>
+        </p:nvSpPr>
+        <p:spPr/>
+        <p:txBody>
+          <a:bodyPr/>
+          <a:lstStyle/>
+          <a:p>
+            <a:r>
+              <a:rPr lang="en-US" dirty="0" smtClean="0"/>
+              <a:t>Resources for Reading Review</a:t>
+            </a:r>
+            <a:endParaRPr lang="en-US" dirty="0"/>
+          </a:p>
+        </p:txBody>
+      </p:sp>
+      <p:sp>
+        <p:nvSpPr>
+          <p:cNvPr id="3" name="Content Placeholder 2"/>
+          <p:cNvSpPr>
+            <a:spLocks noGrp="1"/>
+          </p:cNvSpPr>
+          <p:nvPr>
+            <p:ph idx="1"/>
+          </p:nvPr>
+        </p:nvSpPr>
+        <p:spPr/>
+        <p:txBody>
+          <a:bodyPr/>
+          <a:lstStyle/>
+          <a:p>
+            <a:endParaRPr lang="en-US"/>
+          </a:p>
+        </p:txBody>
+      </p:sp>
+    </p:spTree>
+    <p:extLst>
+      <p:ext uri="{BB962C8B-B14F-4D97-AF65-F5344CB8AC3E}">
+        <p14:creationId xmlns:p14="http://schemas.microsoft.com/office/powerpoint/2010/main" val="3445837261"/>
+      </p:ext>
+    </p:extLst>
+  </p:cSld>
+  <p:clrMapOvr>
+    <a:masterClrMapping/>
+  </p:clrMapOvr>
+</p:sld>
+</file>
+
+<file path=ppt/slides/slide12.xml><?xml version="1.0" encoding="utf-8"?>
+<p:sld xmlns:a="http://schemas.openxmlformats.org/drawingml/2006/main" xmlns:r="http://schemas.openxmlformats.org/officeDocument/2006/relationships" xmlns:p="http://schemas.openxmlformats.org/presentationml/2006/main">
+  <p:cSld>
+    <p:spTree>
+      <p:nvGrpSpPr>
+        <p:cNvPr id="1" name=""/>
+        <p:cNvGrpSpPr/>
+        <p:nvPr/>
+      </p:nvGrpSpPr>
+      <p:grpSpPr>
+        <a:xfrm>
+          <a:off x="0" y="0"/>
+          <a:ext cx="0" cy="0"/>
+          <a:chOff x="0" y="0"/>
+          <a:chExt cx="0" cy="0"/>
+        </a:xfrm>
+      </p:grpSpPr>
+      <p:sp>
+        <p:nvSpPr>
           <p:cNvPr id="3" name="Title 2"/>
           <p:cNvSpPr>
             <a:spLocks noGrp="1"/>
@@ -22966,18 +23048,1789 @@
   <p:clrMapOvr>
     <a:masterClrMapping/>
   </p:clrMapOvr>
-  <mc:AlternateContent xmlns:mc="http://schemas.openxmlformats.org/markup-compatibility/2006">
-    <mc:Choice xmlns:p14="http://schemas.microsoft.com/office/powerpoint/2010/main" Requires="p14">
+  <mc:AlternateContent xmlns:mc="http://schemas.openxmlformats.org/markup-compatibility/2006" xmlns:p14="http://schemas.microsoft.com/office/powerpoint/2010/main">
+    <mc:Choice Requires="p14">
       <p:transition spd="slow" p14:dur="2000"/>
     </mc:Choice>
-    <mc:Fallback>
+    <mc:Fallback xmlns="">
       <p:transition spd="slow"/>
     </mc:Fallback>
   </mc:AlternateContent>
 </p:sld>
 </file>
 
-<file path=ppt/slides/slide12.xml><?xml version="1.0" encoding="utf-8"?>
+<file path=ppt/slides/slide13.xml><?xml version="1.0" encoding="utf-8"?>
+<p:sld xmlns:a="http://schemas.openxmlformats.org/drawingml/2006/main" xmlns:r="http://schemas.openxmlformats.org/officeDocument/2006/relationships" xmlns:p="http://schemas.openxmlformats.org/presentationml/2006/main">
+  <p:cSld>
+    <p:spTree>
+      <p:nvGrpSpPr>
+        <p:cNvPr id="1" name=""/>
+        <p:cNvGrpSpPr/>
+        <p:nvPr/>
+      </p:nvGrpSpPr>
+      <p:grpSpPr>
+        <a:xfrm>
+          <a:off x="0" y="0"/>
+          <a:ext cx="0" cy="0"/>
+          <a:chOff x="0" y="0"/>
+          <a:chExt cx="0" cy="0"/>
+        </a:xfrm>
+      </p:grpSpPr>
+      <p:sp>
+        <p:nvSpPr>
+          <p:cNvPr id="2" name="Title 1"/>
+          <p:cNvSpPr>
+            <a:spLocks noGrp="1"/>
+          </p:cNvSpPr>
+          <p:nvPr>
+            <p:ph type="title"/>
+          </p:nvPr>
+        </p:nvSpPr>
+        <p:spPr/>
+        <p:txBody>
+          <a:bodyPr/>
+          <a:lstStyle/>
+          <a:p>
+            <a:r>
+              <a:rPr lang="en-US" dirty="0" smtClean="0"/>
+              <a:t>NSF: the DMP may include</a:t>
+            </a:r>
+            <a:endParaRPr lang="en-US" dirty="0"/>
+          </a:p>
+        </p:txBody>
+      </p:sp>
+      <p:sp>
+        <p:nvSpPr>
+          <p:cNvPr id="3" name="Content Placeholder 2"/>
+          <p:cNvSpPr>
+            <a:spLocks noGrp="1"/>
+          </p:cNvSpPr>
+          <p:nvPr>
+            <p:ph idx="1"/>
+          </p:nvPr>
+        </p:nvSpPr>
+        <p:spPr/>
+        <p:txBody>
+          <a:bodyPr>
+            <a:normAutofit lnSpcReduction="10000"/>
+          </a:bodyPr>
+          <a:lstStyle/>
+          <a:p>
+            <a:r>
+              <a:rPr lang="en-US" dirty="0" smtClean="0"/>
+              <a:t>the </a:t>
+            </a:r>
+            <a:r>
+              <a:rPr lang="en-US" dirty="0"/>
+              <a:t>types of data, samples, physical collections, software, curriculum materials, and other materials to be produced in the course of the project;</a:t>
+            </a:r>
+          </a:p>
+          <a:p>
+            <a:r>
+              <a:rPr lang="en-US" dirty="0" smtClean="0"/>
+              <a:t>the </a:t>
+            </a:r>
+            <a:r>
+              <a:rPr lang="en-US" dirty="0"/>
+              <a:t>standards to be used for data and metadata format and content (where existing standards are absent or deemed inadequate, this should be documented along with any proposed solutions or remedies);</a:t>
+            </a:r>
+          </a:p>
+          <a:p>
+            <a:r>
+              <a:rPr lang="en-US" dirty="0" smtClean="0"/>
+              <a:t>policies </a:t>
+            </a:r>
+            <a:r>
+              <a:rPr lang="en-US" dirty="0"/>
+              <a:t>for access and sharing including provisions for appropriate protection of privacy, confidentiality, security, intellectual property, or other rights or requirements;</a:t>
+            </a:r>
+          </a:p>
+          <a:p>
+            <a:r>
+              <a:rPr lang="en-US" dirty="0" smtClean="0"/>
+              <a:t>policies </a:t>
+            </a:r>
+            <a:r>
+              <a:rPr lang="en-US" dirty="0"/>
+              <a:t>and provisions for re-use, re-distribution, and the production of derivatives; and</a:t>
+            </a:r>
+          </a:p>
+          <a:p>
+            <a:r>
+              <a:rPr lang="en-US" dirty="0" smtClean="0"/>
+              <a:t>plans </a:t>
+            </a:r>
+            <a:r>
+              <a:rPr lang="en-US" dirty="0"/>
+              <a:t>for archiving data, samples, and other research products, and for preservation of access to them.</a:t>
+            </a:r>
+          </a:p>
+          <a:p>
+            <a:endParaRPr lang="en-US" dirty="0"/>
+          </a:p>
+        </p:txBody>
+      </p:sp>
+      <p:sp>
+        <p:nvSpPr>
+          <p:cNvPr id="4" name="Rectangle 3"/>
+          <p:cNvSpPr/>
+          <p:nvPr/>
+        </p:nvSpPr>
+        <p:spPr>
+          <a:xfrm>
+            <a:off x="3411681" y="6176963"/>
+            <a:ext cx="7613073" cy="307777"/>
+          </a:xfrm>
+          <a:prstGeom prst="rect">
+            <a:avLst/>
+          </a:prstGeom>
+        </p:spPr>
+        <p:txBody>
+          <a:bodyPr wrap="square">
+            <a:spAutoFit/>
+          </a:bodyPr>
+          <a:lstStyle/>
+          <a:p>
+            <a:r>
+              <a:rPr lang="en-US" sz="1400" dirty="0">
+                <a:solidFill>
+                  <a:schemeClr val="tx1">
+                    <a:lumMod val="65000"/>
+                    <a:lumOff val="35000"/>
+                  </a:schemeClr>
+                </a:solidFill>
+                <a:hlinkClick r:id="rId2"/>
+              </a:rPr>
+              <a:t>http://</a:t>
+            </a:r>
+            <a:r>
+              <a:rPr lang="en-US" sz="1400" dirty="0" smtClean="0">
+                <a:solidFill>
+                  <a:schemeClr val="tx1">
+                    <a:lumMod val="65000"/>
+                    <a:lumOff val="35000"/>
+                  </a:schemeClr>
+                </a:solidFill>
+                <a:hlinkClick r:id="rId2"/>
+              </a:rPr>
+              <a:t>www.nsf.gov/pubs/policydocs/pappguide/nsf15001/gpg_2.jsp#dmp</a:t>
+            </a:r>
+            <a:r>
+              <a:rPr lang="en-US" sz="1400" dirty="0" smtClean="0">
+                <a:solidFill>
+                  <a:schemeClr val="tx1">
+                    <a:lumMod val="65000"/>
+                    <a:lumOff val="35000"/>
+                  </a:schemeClr>
+                </a:solidFill>
+              </a:rPr>
+              <a:t> </a:t>
+            </a:r>
+            <a:endParaRPr lang="en-US" sz="1400" dirty="0">
+              <a:solidFill>
+                <a:schemeClr val="tx1">
+                  <a:lumMod val="65000"/>
+                  <a:lumOff val="35000"/>
+                </a:schemeClr>
+              </a:solidFill>
+            </a:endParaRPr>
+          </a:p>
+        </p:txBody>
+      </p:sp>
+    </p:spTree>
+    <p:extLst>
+      <p:ext uri="{BB962C8B-B14F-4D97-AF65-F5344CB8AC3E}">
+        <p14:creationId xmlns:p14="http://schemas.microsoft.com/office/powerpoint/2010/main" val="2213357523"/>
+      </p:ext>
+    </p:extLst>
+  </p:cSld>
+  <p:clrMapOvr>
+    <a:masterClrMapping/>
+  </p:clrMapOvr>
+</p:sld>
+</file>
+
+<file path=ppt/slides/slide14.xml><?xml version="1.0" encoding="utf-8"?>
+<p:sld xmlns:a="http://schemas.openxmlformats.org/drawingml/2006/main" xmlns:r="http://schemas.openxmlformats.org/officeDocument/2006/relationships" xmlns:p="http://schemas.openxmlformats.org/presentationml/2006/main">
+  <p:cSld>
+    <p:spTree>
+      <p:nvGrpSpPr>
+        <p:cNvPr id="1" name=""/>
+        <p:cNvGrpSpPr/>
+        <p:nvPr/>
+      </p:nvGrpSpPr>
+      <p:grpSpPr>
+        <a:xfrm>
+          <a:off x="0" y="0"/>
+          <a:ext cx="0" cy="0"/>
+          <a:chOff x="0" y="0"/>
+          <a:chExt cx="0" cy="0"/>
+        </a:xfrm>
+      </p:grpSpPr>
+      <p:sp>
+        <p:nvSpPr>
+          <p:cNvPr id="2" name="Title 1"/>
+          <p:cNvSpPr>
+            <a:spLocks noGrp="1"/>
+          </p:cNvSpPr>
+          <p:nvPr>
+            <p:ph type="title"/>
+          </p:nvPr>
+        </p:nvSpPr>
+        <p:spPr/>
+        <p:txBody>
+          <a:bodyPr/>
+          <a:lstStyle/>
+          <a:p>
+            <a:r>
+              <a:rPr lang="en-US" dirty="0" smtClean="0"/>
+              <a:t>My Data Management Plan – a satire</a:t>
+            </a:r>
+            <a:endParaRPr lang="en-US" dirty="0"/>
+          </a:p>
+        </p:txBody>
+      </p:sp>
+      <p:sp>
+        <p:nvSpPr>
+          <p:cNvPr id="3" name="Content Placeholder 2"/>
+          <p:cNvSpPr>
+            <a:spLocks noGrp="1"/>
+          </p:cNvSpPr>
+          <p:nvPr>
+            <p:ph idx="1"/>
+          </p:nvPr>
+        </p:nvSpPr>
+        <p:spPr>
+          <a:xfrm>
+            <a:off x="838200" y="1690690"/>
+            <a:ext cx="10515600" cy="4486273"/>
+          </a:xfrm>
+        </p:spPr>
+        <p:txBody>
+          <a:bodyPr>
+            <a:normAutofit/>
+          </a:bodyPr>
+          <a:lstStyle/>
+          <a:p>
+            <a:pPr marL="0" indent="0">
+              <a:buNone/>
+            </a:pPr>
+            <a:r>
+              <a:rPr lang="en-US" dirty="0"/>
+              <a:t>Dear NSF,</a:t>
+            </a:r>
+          </a:p>
+          <a:p>
+            <a:pPr marL="0" indent="0">
+              <a:buNone/>
+            </a:pPr>
+            <a:r>
+              <a:rPr lang="en-US" dirty="0"/>
+              <a:t>I am happy to respond to your request for a 2-page Data Management Plan.</a:t>
+            </a:r>
+          </a:p>
+          <a:p>
+            <a:pPr marL="0" indent="0">
+              <a:buNone/>
+            </a:pPr>
+            <a:r>
+              <a:rPr lang="en-US" dirty="0"/>
+              <a:t>First of all, let me say how enthusiastic I am that you have embraced this new field of "large scale data analysis". Ever since I started working with large </a:t>
+            </a:r>
+            <a:r>
+              <a:rPr lang="en-US" dirty="0" err="1"/>
+              <a:t>Avida</a:t>
+            </a:r>
+            <a:r>
+              <a:rPr lang="en-US" dirty="0"/>
+              <a:t> data sets in 1993, then with large meteorological data sets in 1995, and then again with large sequence data sets in 1999, I have seen the need for a systematic plan to manage the data. It is nice to see NSF stepping up to the plate in such a timely manner, and I am happy to comply.</a:t>
+            </a:r>
+          </a:p>
+          <a:p>
+            <a:pPr marL="0" indent="0">
+              <a:buNone/>
+            </a:pPr>
+            <a:r>
+              <a:rPr lang="en-US" dirty="0"/>
+              <a:t>Now, as to my actual data management plan, here is how I plan to deal with research data in the future</a:t>
+            </a:r>
+            <a:r>
+              <a:rPr lang="en-US" dirty="0" smtClean="0"/>
+              <a:t>.</a:t>
+            </a:r>
+            <a:endParaRPr lang="en-US" dirty="0"/>
+          </a:p>
+        </p:txBody>
+      </p:sp>
+      <p:sp>
+        <p:nvSpPr>
+          <p:cNvPr id="4" name="Rectangle 3"/>
+          <p:cNvSpPr/>
+          <p:nvPr/>
+        </p:nvSpPr>
+        <p:spPr>
+          <a:xfrm>
+            <a:off x="6265024" y="5925757"/>
+            <a:ext cx="3896516" cy="307777"/>
+          </a:xfrm>
+          <a:prstGeom prst="rect">
+            <a:avLst/>
+          </a:prstGeom>
+        </p:spPr>
+        <p:txBody>
+          <a:bodyPr wrap="none">
+            <a:spAutoFit/>
+          </a:bodyPr>
+          <a:lstStyle/>
+          <a:p>
+            <a:r>
+              <a:rPr lang="en-US" sz="1400" dirty="0">
+                <a:solidFill>
+                  <a:schemeClr val="tx1">
+                    <a:lumMod val="65000"/>
+                    <a:lumOff val="35000"/>
+                  </a:schemeClr>
+                </a:solidFill>
+                <a:hlinkClick r:id="rId2"/>
+              </a:rPr>
+              <a:t>http://</a:t>
+            </a:r>
+            <a:r>
+              <a:rPr lang="en-US" sz="1400" dirty="0" smtClean="0">
+                <a:solidFill>
+                  <a:schemeClr val="tx1">
+                    <a:lumMod val="65000"/>
+                    <a:lumOff val="35000"/>
+                  </a:schemeClr>
+                </a:solidFill>
+                <a:hlinkClick r:id="rId2"/>
+              </a:rPr>
+              <a:t>ivory.idyll.org/blog/data-management.html</a:t>
+            </a:r>
+            <a:r>
+              <a:rPr lang="en-US" sz="1400" dirty="0" smtClean="0">
+                <a:solidFill>
+                  <a:schemeClr val="tx1">
+                    <a:lumMod val="65000"/>
+                    <a:lumOff val="35000"/>
+                  </a:schemeClr>
+                </a:solidFill>
+              </a:rPr>
+              <a:t> </a:t>
+            </a:r>
+            <a:endParaRPr lang="en-US" sz="1400" dirty="0">
+              <a:solidFill>
+                <a:schemeClr val="tx1">
+                  <a:lumMod val="65000"/>
+                  <a:lumOff val="35000"/>
+                </a:schemeClr>
+              </a:solidFill>
+            </a:endParaRPr>
+          </a:p>
+        </p:txBody>
+      </p:sp>
+      <p:sp>
+        <p:nvSpPr>
+          <p:cNvPr id="5" name="Rectangle 4"/>
+          <p:cNvSpPr/>
+          <p:nvPr/>
+        </p:nvSpPr>
+        <p:spPr>
+          <a:xfrm>
+            <a:off x="4853357" y="5874593"/>
+            <a:ext cx="1536959" cy="369332"/>
+          </a:xfrm>
+          <a:prstGeom prst="rect">
+            <a:avLst/>
+          </a:prstGeom>
+        </p:spPr>
+        <p:txBody>
+          <a:bodyPr wrap="none">
+            <a:spAutoFit/>
+          </a:bodyPr>
+          <a:lstStyle/>
+          <a:p>
+            <a:r>
+              <a:rPr lang="en-US" dirty="0" smtClean="0"/>
+              <a:t>Read more . . .</a:t>
+            </a:r>
+            <a:endParaRPr lang="en-US" dirty="0"/>
+          </a:p>
+        </p:txBody>
+      </p:sp>
+    </p:spTree>
+    <p:extLst>
+      <p:ext uri="{BB962C8B-B14F-4D97-AF65-F5344CB8AC3E}">
+        <p14:creationId xmlns:p14="http://schemas.microsoft.com/office/powerpoint/2010/main" val="3319122162"/>
+      </p:ext>
+    </p:extLst>
+  </p:cSld>
+  <p:clrMapOvr>
+    <a:masterClrMapping/>
+  </p:clrMapOvr>
+</p:sld>
+</file>
+
+<file path=ppt/slides/slide15.xml><?xml version="1.0" encoding="utf-8"?>
+<p:sld xmlns:a="http://schemas.openxmlformats.org/drawingml/2006/main" xmlns:r="http://schemas.openxmlformats.org/officeDocument/2006/relationships" xmlns:p="http://schemas.openxmlformats.org/presentationml/2006/main">
+  <p:cSld>
+    <p:spTree>
+      <p:nvGrpSpPr>
+        <p:cNvPr id="1" name=""/>
+        <p:cNvGrpSpPr/>
+        <p:nvPr/>
+      </p:nvGrpSpPr>
+      <p:grpSpPr>
+        <a:xfrm>
+          <a:off x="0" y="0"/>
+          <a:ext cx="0" cy="0"/>
+          <a:chOff x="0" y="0"/>
+          <a:chExt cx="0" cy="0"/>
+        </a:xfrm>
+      </p:grpSpPr>
+      <p:sp>
+        <p:nvSpPr>
+          <p:cNvPr id="2" name="Title 1"/>
+          <p:cNvSpPr>
+            <a:spLocks noGrp="1"/>
+          </p:cNvSpPr>
+          <p:nvPr>
+            <p:ph type="title"/>
+          </p:nvPr>
+        </p:nvSpPr>
+        <p:spPr/>
+        <p:txBody>
+          <a:bodyPr/>
+          <a:lstStyle/>
+          <a:p>
+            <a:r>
+              <a:rPr lang="en-US" dirty="0" smtClean="0"/>
+              <a:t>Open Data</a:t>
+            </a:r>
+            <a:endParaRPr lang="en-US" dirty="0"/>
+          </a:p>
+        </p:txBody>
+      </p:sp>
+      <p:sp>
+        <p:nvSpPr>
+          <p:cNvPr id="3" name="Content Placeholder 2"/>
+          <p:cNvSpPr>
+            <a:spLocks noGrp="1"/>
+          </p:cNvSpPr>
+          <p:nvPr>
+            <p:ph idx="1"/>
+          </p:nvPr>
+        </p:nvSpPr>
+        <p:spPr/>
+        <p:txBody>
+          <a:bodyPr/>
+          <a:lstStyle/>
+          <a:p>
+            <a:endParaRPr lang="en-US"/>
+          </a:p>
+        </p:txBody>
+      </p:sp>
+    </p:spTree>
+    <p:extLst>
+      <p:ext uri="{BB962C8B-B14F-4D97-AF65-F5344CB8AC3E}">
+        <p14:creationId xmlns:p14="http://schemas.microsoft.com/office/powerpoint/2010/main" val="1152201013"/>
+      </p:ext>
+    </p:extLst>
+  </p:cSld>
+  <p:clrMapOvr>
+    <a:masterClrMapping/>
+  </p:clrMapOvr>
+</p:sld>
+</file>
+
+<file path=ppt/slides/slide16.xml><?xml version="1.0" encoding="utf-8"?>
+<p:sld xmlns:a="http://schemas.openxmlformats.org/drawingml/2006/main" xmlns:r="http://schemas.openxmlformats.org/officeDocument/2006/relationships" xmlns:p="http://schemas.openxmlformats.org/presentationml/2006/main">
+  <p:cSld>
+    <p:spTree>
+      <p:nvGrpSpPr>
+        <p:cNvPr id="1" name=""/>
+        <p:cNvGrpSpPr/>
+        <p:nvPr/>
+      </p:nvGrpSpPr>
+      <p:grpSpPr>
+        <a:xfrm>
+          <a:off x="0" y="0"/>
+          <a:ext cx="0" cy="0"/>
+          <a:chOff x="0" y="0"/>
+          <a:chExt cx="0" cy="0"/>
+        </a:xfrm>
+      </p:grpSpPr>
+      <p:sp>
+        <p:nvSpPr>
+          <p:cNvPr id="2" name="Title 1"/>
+          <p:cNvSpPr>
+            <a:spLocks noGrp="1"/>
+          </p:cNvSpPr>
+          <p:nvPr>
+            <p:ph type="title"/>
+          </p:nvPr>
+        </p:nvSpPr>
+        <p:spPr/>
+        <p:txBody>
+          <a:bodyPr/>
+          <a:lstStyle/>
+          <a:p>
+            <a:r>
+              <a:rPr lang="en-US" dirty="0" smtClean="0"/>
+              <a:t>Open Data</a:t>
+            </a:r>
+            <a:endParaRPr lang="en-US" dirty="0"/>
+          </a:p>
+        </p:txBody>
+      </p:sp>
+      <p:sp>
+        <p:nvSpPr>
+          <p:cNvPr id="3" name="Content Placeholder 2"/>
+          <p:cNvSpPr>
+            <a:spLocks noGrp="1"/>
+          </p:cNvSpPr>
+          <p:nvPr>
+            <p:ph idx="1"/>
+          </p:nvPr>
+        </p:nvSpPr>
+        <p:spPr>
+          <a:xfrm>
+            <a:off x="838200" y="1690690"/>
+            <a:ext cx="10515600" cy="4486273"/>
+          </a:xfrm>
+        </p:spPr>
+        <p:txBody>
+          <a:bodyPr>
+            <a:normAutofit fontScale="92500" lnSpcReduction="10000"/>
+          </a:bodyPr>
+          <a:lstStyle/>
+          <a:p>
+            <a:r>
+              <a:rPr lang="en-US" dirty="0" smtClean="0"/>
+              <a:t>‘Open Data’ is considered a movement</a:t>
+            </a:r>
+          </a:p>
+          <a:p>
+            <a:r>
+              <a:rPr lang="en-US" dirty="0" smtClean="0"/>
+              <a:t>Open Data is related to, but not the same as, open access (publishing)</a:t>
+            </a:r>
+          </a:p>
+          <a:p>
+            <a:r>
+              <a:rPr lang="en-US" dirty="0" smtClean="0"/>
+              <a:t>Data cannot be copyrighted, but it can be owned</a:t>
+            </a:r>
+          </a:p>
+          <a:p>
+            <a:r>
+              <a:rPr lang="en-US" dirty="0" smtClean="0"/>
+              <a:t>Open Data, like Open Access, is really a misnomer in the global context</a:t>
+            </a:r>
+          </a:p>
+          <a:p>
+            <a:pPr lvl="1"/>
+            <a:r>
+              <a:rPr lang="en-US" dirty="0" smtClean="0"/>
+              <a:t>While data may be ‘open’, many people still don’t have access to it</a:t>
+            </a:r>
+          </a:p>
+          <a:p>
+            <a:pPr lvl="1"/>
+            <a:r>
+              <a:rPr lang="en-US" dirty="0" smtClean="0"/>
+              <a:t>Often tools and/or knowledge are not available for access to open data</a:t>
+            </a:r>
+          </a:p>
+          <a:p>
+            <a:r>
+              <a:rPr lang="en-US" dirty="0" smtClean="0"/>
+              <a:t>Open data is different for:</a:t>
+            </a:r>
+          </a:p>
+          <a:p>
+            <a:pPr lvl="1"/>
+            <a:r>
+              <a:rPr lang="en-US" dirty="0"/>
+              <a:t>Government: </a:t>
+            </a:r>
+            <a:r>
+              <a:rPr lang="en-US" dirty="0">
+                <a:hlinkClick r:id="rId2"/>
+              </a:rPr>
+              <a:t>https://www.data.gov</a:t>
+            </a:r>
+            <a:r>
+              <a:rPr lang="en-US" dirty="0" smtClean="0">
+                <a:hlinkClick r:id="rId2"/>
+              </a:rPr>
+              <a:t>/</a:t>
+            </a:r>
+            <a:endParaRPr lang="en-US" dirty="0" smtClean="0"/>
+          </a:p>
+          <a:p>
+            <a:pPr lvl="1"/>
+            <a:r>
+              <a:rPr lang="en-US" dirty="0" smtClean="0"/>
+              <a:t>Research: </a:t>
+            </a:r>
+            <a:r>
+              <a:rPr lang="en-US" dirty="0">
+                <a:hlinkClick r:id="rId3"/>
+              </a:rPr>
+              <a:t>http://www.opendataresearch.org</a:t>
+            </a:r>
+            <a:r>
+              <a:rPr lang="en-US" dirty="0" smtClean="0">
+                <a:hlinkClick r:id="rId3"/>
+              </a:rPr>
+              <a:t>/</a:t>
+            </a:r>
+            <a:endParaRPr lang="en-US" dirty="0" smtClean="0"/>
+          </a:p>
+          <a:p>
+            <a:pPr lvl="1"/>
+            <a:r>
+              <a:rPr lang="en-US" dirty="0" smtClean="0"/>
+              <a:t>Business:  . . . . </a:t>
+            </a:r>
+          </a:p>
+          <a:p>
+            <a:r>
+              <a:rPr lang="en-US" dirty="0"/>
+              <a:t>Some data cannot be shared due to privacy concerns (human subjects)</a:t>
+            </a:r>
+          </a:p>
+          <a:p>
+            <a:r>
+              <a:rPr lang="en-US" dirty="0"/>
+              <a:t>Often the term open data refers to ‘open linked data’ (we will discuss this more later in the course</a:t>
+            </a:r>
+            <a:r>
+              <a:rPr lang="en-US" dirty="0" smtClean="0"/>
+              <a:t>)</a:t>
+            </a:r>
+          </a:p>
+          <a:p>
+            <a:pPr lvl="1"/>
+            <a:endParaRPr lang="en-US" dirty="0" smtClean="0"/>
+          </a:p>
+        </p:txBody>
+      </p:sp>
+    </p:spTree>
+    <p:extLst>
+      <p:ext uri="{BB962C8B-B14F-4D97-AF65-F5344CB8AC3E}">
+        <p14:creationId xmlns:p14="http://schemas.microsoft.com/office/powerpoint/2010/main" val="3104601569"/>
+      </p:ext>
+    </p:extLst>
+  </p:cSld>
+  <p:clrMapOvr>
+    <a:masterClrMapping/>
+  </p:clrMapOvr>
+</p:sld>
+</file>
+
+<file path=ppt/slides/slide17.xml><?xml version="1.0" encoding="utf-8"?>
+<p:sld xmlns:a="http://schemas.openxmlformats.org/drawingml/2006/main" xmlns:r="http://schemas.openxmlformats.org/officeDocument/2006/relationships" xmlns:p="http://schemas.openxmlformats.org/presentationml/2006/main">
+  <p:cSld>
+    <p:spTree>
+      <p:nvGrpSpPr>
+        <p:cNvPr id="1" name=""/>
+        <p:cNvGrpSpPr/>
+        <p:nvPr/>
+      </p:nvGrpSpPr>
+      <p:grpSpPr>
+        <a:xfrm>
+          <a:off x="0" y="0"/>
+          <a:ext cx="0" cy="0"/>
+          <a:chOff x="0" y="0"/>
+          <a:chExt cx="0" cy="0"/>
+        </a:xfrm>
+      </p:grpSpPr>
+      <p:sp>
+        <p:nvSpPr>
+          <p:cNvPr id="2" name="Title 1"/>
+          <p:cNvSpPr>
+            <a:spLocks noGrp="1"/>
+          </p:cNvSpPr>
+          <p:nvPr>
+            <p:ph type="title"/>
+          </p:nvPr>
+        </p:nvSpPr>
+        <p:spPr/>
+        <p:txBody>
+          <a:bodyPr/>
+          <a:lstStyle/>
+          <a:p>
+            <a:r>
+              <a:rPr lang="en-US" dirty="0" smtClean="0"/>
+              <a:t>What is Open?</a:t>
+            </a:r>
+            <a:endParaRPr lang="en-US" dirty="0"/>
+          </a:p>
+        </p:txBody>
+      </p:sp>
+      <p:sp>
+        <p:nvSpPr>
+          <p:cNvPr id="3" name="Content Placeholder 2"/>
+          <p:cNvSpPr>
+            <a:spLocks noGrp="1"/>
+          </p:cNvSpPr>
+          <p:nvPr>
+            <p:ph idx="1"/>
+          </p:nvPr>
+        </p:nvSpPr>
+        <p:spPr>
+          <a:xfrm>
+            <a:off x="838199" y="1825625"/>
+            <a:ext cx="10851573" cy="4351338"/>
+          </a:xfrm>
+        </p:spPr>
+        <p:txBody>
+          <a:bodyPr/>
+          <a:lstStyle/>
+          <a:p>
+            <a:r>
+              <a:rPr lang="en-US" dirty="0" smtClean="0"/>
+              <a:t>Access – </a:t>
+            </a:r>
+            <a:r>
+              <a:rPr lang="en-US" sz="2000" dirty="0" smtClean="0"/>
+              <a:t>who can access the data? How?</a:t>
+            </a:r>
+            <a:endParaRPr lang="en-US" dirty="0" smtClean="0"/>
+          </a:p>
+          <a:p>
+            <a:r>
+              <a:rPr lang="en-US" dirty="0" smtClean="0"/>
+              <a:t>Redistribution – </a:t>
+            </a:r>
+            <a:r>
+              <a:rPr lang="en-US" sz="2000" dirty="0" smtClean="0"/>
+              <a:t>how is the data redistributed? Who controls?</a:t>
+            </a:r>
+            <a:endParaRPr lang="en-US" dirty="0" smtClean="0"/>
+          </a:p>
+          <a:p>
+            <a:r>
+              <a:rPr lang="en-US" dirty="0" smtClean="0"/>
+              <a:t>Reuse – </a:t>
+            </a:r>
+            <a:r>
+              <a:rPr lang="en-US" sz="2000" dirty="0" smtClean="0"/>
+              <a:t>How is the data documented, formatted, and packaged. Is it possible for anyone to reuse?</a:t>
+            </a:r>
+          </a:p>
+          <a:p>
+            <a:r>
+              <a:rPr lang="en-US" dirty="0" smtClean="0"/>
+              <a:t>Absence of </a:t>
+            </a:r>
+            <a:r>
+              <a:rPr lang="en-US" dirty="0"/>
+              <a:t>t</a:t>
+            </a:r>
+            <a:r>
+              <a:rPr lang="en-US" dirty="0" smtClean="0"/>
+              <a:t>echnological restriction – </a:t>
+            </a:r>
+            <a:r>
+              <a:rPr lang="en-US" sz="2000" dirty="0" smtClean="0"/>
+              <a:t>Is there proprietary software needed?</a:t>
+            </a:r>
+          </a:p>
+          <a:p>
+            <a:r>
+              <a:rPr lang="en-US" dirty="0" smtClean="0"/>
+              <a:t>Attribution – </a:t>
+            </a:r>
+            <a:r>
+              <a:rPr lang="en-US" sz="2000" dirty="0" smtClean="0"/>
+              <a:t>Who is the author (really)? Where did the data come from (sensor)?</a:t>
+            </a:r>
+          </a:p>
+          <a:p>
+            <a:r>
+              <a:rPr lang="en-US" dirty="0" smtClean="0"/>
+              <a:t>Integrity – </a:t>
+            </a:r>
+            <a:r>
+              <a:rPr lang="en-US" sz="2000" dirty="0" smtClean="0"/>
+              <a:t>just because it is open, does not mean it is good data. Problem?</a:t>
+            </a:r>
+          </a:p>
+          <a:p>
+            <a:r>
+              <a:rPr lang="en-US" dirty="0" smtClean="0"/>
+              <a:t>Discrimination (against groups or beliefs) – </a:t>
+            </a:r>
+            <a:r>
+              <a:rPr lang="en-US" sz="2000" dirty="0" smtClean="0"/>
+              <a:t>remember all data is contextual. Might data be produced from a discriminatory stance or lead to discriminatory conclusions?</a:t>
+            </a:r>
+          </a:p>
+          <a:p>
+            <a:r>
+              <a:rPr lang="en-US" dirty="0" smtClean="0"/>
+              <a:t>License – </a:t>
+            </a:r>
+            <a:r>
+              <a:rPr lang="en-US" sz="2000" dirty="0" smtClean="0"/>
+              <a:t>How is the license distributed? Does this change if a data set grows or is a derived from another data set? Does the license </a:t>
+            </a:r>
+            <a:r>
+              <a:rPr lang="en-US" sz="2000" dirty="0" err="1" smtClean="0"/>
+              <a:t>propogate</a:t>
+            </a:r>
+            <a:endParaRPr lang="en-US" sz="2000" dirty="0" smtClean="0"/>
+          </a:p>
+          <a:p>
+            <a:pPr marL="0" indent="0">
+              <a:buNone/>
+            </a:pPr>
+            <a:endParaRPr lang="en-US" dirty="0"/>
+          </a:p>
+        </p:txBody>
+      </p:sp>
+    </p:spTree>
+    <p:extLst>
+      <p:ext uri="{BB962C8B-B14F-4D97-AF65-F5344CB8AC3E}">
+        <p14:creationId xmlns:p14="http://schemas.microsoft.com/office/powerpoint/2010/main" val="2411540990"/>
+      </p:ext>
+    </p:extLst>
+  </p:cSld>
+  <p:clrMapOvr>
+    <a:masterClrMapping/>
+  </p:clrMapOvr>
+</p:sld>
+</file>
+
+<file path=ppt/slides/slide18.xml><?xml version="1.0" encoding="utf-8"?>
+<p:sld xmlns:a="http://schemas.openxmlformats.org/drawingml/2006/main" xmlns:r="http://schemas.openxmlformats.org/officeDocument/2006/relationships" xmlns:p="http://schemas.openxmlformats.org/presentationml/2006/main">
+  <p:cSld>
+    <p:spTree>
+      <p:nvGrpSpPr>
+        <p:cNvPr id="1" name=""/>
+        <p:cNvGrpSpPr/>
+        <p:nvPr/>
+      </p:nvGrpSpPr>
+      <p:grpSpPr>
+        <a:xfrm>
+          <a:off x="0" y="0"/>
+          <a:ext cx="0" cy="0"/>
+          <a:chOff x="0" y="0"/>
+          <a:chExt cx="0" cy="0"/>
+        </a:xfrm>
+      </p:grpSpPr>
+      <p:sp>
+        <p:nvSpPr>
+          <p:cNvPr id="2" name="Title 1"/>
+          <p:cNvSpPr>
+            <a:spLocks noGrp="1"/>
+          </p:cNvSpPr>
+          <p:nvPr>
+            <p:ph type="title"/>
+          </p:nvPr>
+        </p:nvSpPr>
+        <p:spPr/>
+        <p:txBody>
+          <a:bodyPr/>
+          <a:lstStyle/>
+          <a:p>
+            <a:r>
+              <a:rPr lang="en-US" dirty="0" smtClean="0"/>
+              <a:t>Levels of open data</a:t>
+            </a:r>
+            <a:endParaRPr lang="en-US" dirty="0"/>
+          </a:p>
+        </p:txBody>
+      </p:sp>
+      <p:sp>
+        <p:nvSpPr>
+          <p:cNvPr id="3" name="Content Placeholder 2"/>
+          <p:cNvSpPr>
+            <a:spLocks noGrp="1"/>
+          </p:cNvSpPr>
+          <p:nvPr>
+            <p:ph idx="1"/>
+          </p:nvPr>
+        </p:nvSpPr>
+        <p:spPr>
+          <a:xfrm>
+            <a:off x="1205345" y="1825625"/>
+            <a:ext cx="9642764" cy="4351338"/>
+          </a:xfrm>
+        </p:spPr>
+        <p:txBody>
+          <a:bodyPr>
+            <a:normAutofit/>
+          </a:bodyPr>
+          <a:lstStyle/>
+          <a:p>
+            <a:pPr marL="457200" indent="-457200">
+              <a:buAutoNum type="arabicPeriod"/>
+            </a:pPr>
+            <a:r>
+              <a:rPr lang="en-US" dirty="0" smtClean="0"/>
+              <a:t>Non-machine readable</a:t>
+            </a:r>
+          </a:p>
+          <a:p>
+            <a:pPr marL="457200" indent="-457200">
+              <a:buAutoNum type="arabicPeriod"/>
+            </a:pPr>
+            <a:r>
+              <a:rPr lang="en-US" dirty="0" smtClean="0"/>
+              <a:t>Machine readable but in proprietary format</a:t>
+            </a:r>
+          </a:p>
+          <a:p>
+            <a:pPr marL="457200" indent="-457200">
+              <a:buAutoNum type="arabicPeriod"/>
+            </a:pPr>
+            <a:r>
+              <a:rPr lang="en-US" dirty="0" smtClean="0"/>
+              <a:t>Machine readable in non-proprietary format</a:t>
+            </a:r>
+          </a:p>
+          <a:p>
+            <a:pPr marL="457200" indent="-457200">
+              <a:buAutoNum type="arabicPeriod"/>
+            </a:pPr>
+            <a:r>
+              <a:rPr lang="en-US" dirty="0" smtClean="0"/>
+              <a:t>Machine readable in non-proprietary format with URI and RDF</a:t>
+            </a:r>
+          </a:p>
+          <a:p>
+            <a:pPr lvl="1"/>
+            <a:r>
+              <a:rPr lang="en-US" dirty="0" smtClean="0"/>
+              <a:t>URI – Uniform Resource Identifier</a:t>
+            </a:r>
+          </a:p>
+          <a:p>
+            <a:pPr lvl="1"/>
+            <a:r>
+              <a:rPr lang="en-US" dirty="0" smtClean="0"/>
+              <a:t>RDF – Resource Description Framework </a:t>
+            </a:r>
+          </a:p>
+          <a:p>
+            <a:pPr lvl="1"/>
+            <a:r>
+              <a:rPr lang="en-US" dirty="0" smtClean="0"/>
+              <a:t>These are both Internet terms (we will discuss later in the class)</a:t>
+            </a:r>
+          </a:p>
+          <a:p>
+            <a:pPr marL="457200" indent="-457200">
+              <a:buFont typeface="Arial" panose="020B0604020202020204" pitchFamily="34" charset="0"/>
+              <a:buAutoNum type="arabicPeriod"/>
+            </a:pPr>
+            <a:r>
+              <a:rPr lang="en-US" dirty="0"/>
+              <a:t>Machine readable in non-proprietary format with URI and RDF – linked to other metadata</a:t>
+            </a:r>
+          </a:p>
+          <a:p>
+            <a:pPr lvl="1"/>
+            <a:r>
+              <a:rPr lang="en-US" dirty="0" smtClean="0"/>
+              <a:t>this last level is the requisite for the ‘semantic web’ (we will discuss later in class)</a:t>
+            </a:r>
+            <a:endParaRPr lang="en-US" dirty="0"/>
+          </a:p>
+        </p:txBody>
+      </p:sp>
+      <p:sp>
+        <p:nvSpPr>
+          <p:cNvPr id="4" name="Rectangle 3"/>
+          <p:cNvSpPr/>
+          <p:nvPr/>
+        </p:nvSpPr>
+        <p:spPr>
+          <a:xfrm>
+            <a:off x="309995" y="1502459"/>
+            <a:ext cx="886691" cy="646331"/>
+          </a:xfrm>
+          <a:prstGeom prst="rect">
+            <a:avLst/>
+          </a:prstGeom>
+        </p:spPr>
+        <p:txBody>
+          <a:bodyPr wrap="square">
+            <a:spAutoFit/>
+          </a:bodyPr>
+          <a:lstStyle/>
+          <a:p>
+            <a:r>
+              <a:rPr lang="en-US" dirty="0" smtClean="0"/>
+              <a:t>Easy to</a:t>
+            </a:r>
+          </a:p>
+          <a:p>
+            <a:r>
+              <a:rPr lang="en-US" dirty="0" smtClean="0"/>
+              <a:t>create</a:t>
+            </a:r>
+            <a:endParaRPr lang="en-US" dirty="0"/>
+          </a:p>
+        </p:txBody>
+      </p:sp>
+      <p:sp>
+        <p:nvSpPr>
+          <p:cNvPr id="5" name="Rectangle 4"/>
+          <p:cNvSpPr/>
+          <p:nvPr/>
+        </p:nvSpPr>
+        <p:spPr>
+          <a:xfrm>
+            <a:off x="309995" y="5530632"/>
+            <a:ext cx="1056409" cy="646331"/>
+          </a:xfrm>
+          <a:prstGeom prst="rect">
+            <a:avLst/>
+          </a:prstGeom>
+        </p:spPr>
+        <p:txBody>
+          <a:bodyPr wrap="square">
+            <a:spAutoFit/>
+          </a:bodyPr>
+          <a:lstStyle/>
+          <a:p>
+            <a:r>
+              <a:rPr lang="en-US" dirty="0" smtClean="0"/>
+              <a:t>Hard to</a:t>
+            </a:r>
+          </a:p>
+          <a:p>
+            <a:r>
+              <a:rPr lang="en-US" dirty="0" smtClean="0"/>
+              <a:t>create</a:t>
+            </a:r>
+            <a:endParaRPr lang="en-US" dirty="0"/>
+          </a:p>
+        </p:txBody>
+      </p:sp>
+      <p:sp>
+        <p:nvSpPr>
+          <p:cNvPr id="6" name="Rectangle 5"/>
+          <p:cNvSpPr/>
+          <p:nvPr/>
+        </p:nvSpPr>
+        <p:spPr>
+          <a:xfrm>
+            <a:off x="10687050" y="1502459"/>
+            <a:ext cx="886691" cy="646331"/>
+          </a:xfrm>
+          <a:prstGeom prst="rect">
+            <a:avLst/>
+          </a:prstGeom>
+        </p:spPr>
+        <p:txBody>
+          <a:bodyPr wrap="square">
+            <a:spAutoFit/>
+          </a:bodyPr>
+          <a:lstStyle/>
+          <a:p>
+            <a:r>
+              <a:rPr lang="en-US" dirty="0" smtClean="0"/>
+              <a:t>Hard to </a:t>
+            </a:r>
+          </a:p>
+          <a:p>
+            <a:r>
+              <a:rPr lang="en-US" dirty="0" smtClean="0"/>
+              <a:t>Re-use</a:t>
+            </a:r>
+            <a:endParaRPr lang="en-US" dirty="0"/>
+          </a:p>
+        </p:txBody>
+      </p:sp>
+      <p:sp>
+        <p:nvSpPr>
+          <p:cNvPr id="7" name="Rectangle 6"/>
+          <p:cNvSpPr/>
+          <p:nvPr/>
+        </p:nvSpPr>
+        <p:spPr>
+          <a:xfrm>
+            <a:off x="10687050" y="5530632"/>
+            <a:ext cx="1056409" cy="646331"/>
+          </a:xfrm>
+          <a:prstGeom prst="rect">
+            <a:avLst/>
+          </a:prstGeom>
+        </p:spPr>
+        <p:txBody>
+          <a:bodyPr wrap="square">
+            <a:spAutoFit/>
+          </a:bodyPr>
+          <a:lstStyle/>
+          <a:p>
+            <a:r>
+              <a:rPr lang="en-US" dirty="0" smtClean="0"/>
+              <a:t>Easy to </a:t>
+            </a:r>
+          </a:p>
+          <a:p>
+            <a:r>
+              <a:rPr lang="en-US" dirty="0" smtClean="0"/>
+              <a:t>Re-use</a:t>
+            </a:r>
+            <a:endParaRPr lang="en-US" dirty="0"/>
+          </a:p>
+        </p:txBody>
+      </p:sp>
+      <p:sp>
+        <p:nvSpPr>
+          <p:cNvPr id="10" name="Up-Down Arrow 9"/>
+          <p:cNvSpPr/>
+          <p:nvPr/>
+        </p:nvSpPr>
+        <p:spPr>
+          <a:xfrm>
+            <a:off x="587085" y="2633263"/>
+            <a:ext cx="332510" cy="2452255"/>
+          </a:xfrm>
+          <a:prstGeom prst="upDownArrow">
+            <a:avLst/>
+          </a:prstGeom>
+          <a:solidFill>
+            <a:schemeClr val="bg1">
+              <a:lumMod val="85000"/>
+            </a:schemeClr>
+          </a:solidFill>
+        </p:spPr>
+        <p:style>
+          <a:lnRef idx="2">
+            <a:schemeClr val="accent1">
+              <a:shade val="50000"/>
+            </a:schemeClr>
+          </a:lnRef>
+          <a:fillRef idx="1">
+            <a:schemeClr val="accent1"/>
+          </a:fillRef>
+          <a:effectRef idx="0">
+            <a:schemeClr val="accent1"/>
+          </a:effectRef>
+          <a:fontRef idx="minor">
+            <a:schemeClr val="lt1"/>
+          </a:fontRef>
+        </p:style>
+        <p:txBody>
+          <a:bodyPr rtlCol="0" anchor="ctr"/>
+          <a:lstStyle/>
+          <a:p>
+            <a:pPr algn="ctr"/>
+            <a:endParaRPr lang="en-US"/>
+          </a:p>
+        </p:txBody>
+      </p:sp>
+      <p:sp>
+        <p:nvSpPr>
+          <p:cNvPr id="11" name="Up-Down Arrow 10"/>
+          <p:cNvSpPr/>
+          <p:nvPr/>
+        </p:nvSpPr>
+        <p:spPr>
+          <a:xfrm>
+            <a:off x="10963274" y="2648017"/>
+            <a:ext cx="332510" cy="2452255"/>
+          </a:xfrm>
+          <a:prstGeom prst="upDownArrow">
+            <a:avLst/>
+          </a:prstGeom>
+          <a:solidFill>
+            <a:schemeClr val="bg1">
+              <a:lumMod val="85000"/>
+            </a:schemeClr>
+          </a:solidFill>
+        </p:spPr>
+        <p:style>
+          <a:lnRef idx="2">
+            <a:schemeClr val="accent1">
+              <a:shade val="50000"/>
+            </a:schemeClr>
+          </a:lnRef>
+          <a:fillRef idx="1">
+            <a:schemeClr val="accent1"/>
+          </a:fillRef>
+          <a:effectRef idx="0">
+            <a:schemeClr val="accent1"/>
+          </a:effectRef>
+          <a:fontRef idx="minor">
+            <a:schemeClr val="lt1"/>
+          </a:fontRef>
+        </p:style>
+        <p:txBody>
+          <a:bodyPr rtlCol="0" anchor="ctr"/>
+          <a:lstStyle/>
+          <a:p>
+            <a:pPr algn="ctr"/>
+            <a:endParaRPr lang="en-US"/>
+          </a:p>
+        </p:txBody>
+      </p:sp>
+    </p:spTree>
+    <p:extLst>
+      <p:ext uri="{BB962C8B-B14F-4D97-AF65-F5344CB8AC3E}">
+        <p14:creationId xmlns:p14="http://schemas.microsoft.com/office/powerpoint/2010/main" val="1652840958"/>
+      </p:ext>
+    </p:extLst>
+  </p:cSld>
+  <p:clrMapOvr>
+    <a:masterClrMapping/>
+  </p:clrMapOvr>
+</p:sld>
+</file>
+
+<file path=ppt/slides/slide19.xml><?xml version="1.0" encoding="utf-8"?>
+<p:sld xmlns:a="http://schemas.openxmlformats.org/drawingml/2006/main" xmlns:r="http://schemas.openxmlformats.org/officeDocument/2006/relationships" xmlns:p="http://schemas.openxmlformats.org/presentationml/2006/main">
+  <p:cSld>
+    <p:spTree>
+      <p:nvGrpSpPr>
+        <p:cNvPr id="1" name=""/>
+        <p:cNvGrpSpPr/>
+        <p:nvPr/>
+      </p:nvGrpSpPr>
+      <p:grpSpPr>
+        <a:xfrm>
+          <a:off x="0" y="0"/>
+          <a:ext cx="0" cy="0"/>
+          <a:chOff x="0" y="0"/>
+          <a:chExt cx="0" cy="0"/>
+        </a:xfrm>
+      </p:grpSpPr>
+      <p:sp>
+        <p:nvSpPr>
+          <p:cNvPr id="2" name="Title 1"/>
+          <p:cNvSpPr>
+            <a:spLocks noGrp="1"/>
+          </p:cNvSpPr>
+          <p:nvPr>
+            <p:ph type="title"/>
+          </p:nvPr>
+        </p:nvSpPr>
+        <p:spPr/>
+        <p:txBody>
+          <a:bodyPr/>
+          <a:lstStyle/>
+          <a:p>
+            <a:r>
+              <a:rPr lang="en-US" dirty="0" smtClean="0"/>
+              <a:t>The Case for Open Data</a:t>
+            </a:r>
+            <a:endParaRPr lang="en-US" dirty="0"/>
+          </a:p>
+        </p:txBody>
+      </p:sp>
+      <p:sp>
+        <p:nvSpPr>
+          <p:cNvPr id="5" name="Content Placeholder 4"/>
+          <p:cNvSpPr>
+            <a:spLocks noGrp="1"/>
+          </p:cNvSpPr>
+          <p:nvPr>
+            <p:ph idx="1"/>
+          </p:nvPr>
+        </p:nvSpPr>
+        <p:spPr/>
+        <p:txBody>
+          <a:bodyPr/>
+          <a:lstStyle/>
+          <a:p>
+            <a:r>
+              <a:rPr lang="en-US" dirty="0" smtClean="0"/>
+              <a:t>Transparency (in government, business and research)</a:t>
+            </a:r>
+          </a:p>
+          <a:p>
+            <a:r>
+              <a:rPr lang="en-US" dirty="0" smtClean="0"/>
+              <a:t>Democracy (better informed decisions and debates)</a:t>
+            </a:r>
+          </a:p>
+          <a:p>
+            <a:r>
+              <a:rPr lang="en-US" dirty="0" smtClean="0"/>
+              <a:t>Increased efficiencies in workflows and production</a:t>
+            </a:r>
+          </a:p>
+          <a:p>
+            <a:r>
+              <a:rPr lang="en-US" dirty="0" smtClean="0"/>
+              <a:t>Publicity campaigns and social license (like green business)</a:t>
+            </a:r>
+          </a:p>
+          <a:p>
+            <a:r>
+              <a:rPr lang="en-US" dirty="0" smtClean="0"/>
+              <a:t>More innovation possible</a:t>
+            </a:r>
+          </a:p>
+          <a:p>
+            <a:endParaRPr lang="en-US" dirty="0"/>
+          </a:p>
+        </p:txBody>
+      </p:sp>
+    </p:spTree>
+    <p:extLst>
+      <p:ext uri="{BB962C8B-B14F-4D97-AF65-F5344CB8AC3E}">
+        <p14:creationId xmlns:p14="http://schemas.microsoft.com/office/powerpoint/2010/main" val="3136811955"/>
+      </p:ext>
+    </p:extLst>
+  </p:cSld>
+  <p:clrMapOvr>
+    <a:masterClrMapping/>
+  </p:clrMapOvr>
+</p:sld>
+</file>
+
+<file path=ppt/slides/slide2.xml><?xml version="1.0" encoding="utf-8"?>
+<p:sld xmlns:a="http://schemas.openxmlformats.org/drawingml/2006/main" xmlns:r="http://schemas.openxmlformats.org/officeDocument/2006/relationships" xmlns:p="http://schemas.openxmlformats.org/presentationml/2006/main">
+  <p:cSld>
+    <p:spTree>
+      <p:nvGrpSpPr>
+        <p:cNvPr id="1" name=""/>
+        <p:cNvGrpSpPr/>
+        <p:nvPr/>
+      </p:nvGrpSpPr>
+      <p:grpSpPr>
+        <a:xfrm>
+          <a:off x="0" y="0"/>
+          <a:ext cx="0" cy="0"/>
+          <a:chOff x="0" y="0"/>
+          <a:chExt cx="0" cy="0"/>
+        </a:xfrm>
+      </p:grpSpPr>
+      <p:sp>
+        <p:nvSpPr>
+          <p:cNvPr id="2" name="Title 1"/>
+          <p:cNvSpPr>
+            <a:spLocks noGrp="1"/>
+          </p:cNvSpPr>
+          <p:nvPr>
+            <p:ph type="title"/>
+          </p:nvPr>
+        </p:nvSpPr>
+        <p:spPr/>
+        <p:txBody>
+          <a:bodyPr/>
+          <a:lstStyle/>
+          <a:p>
+            <a:r>
+              <a:rPr lang="en-US" dirty="0"/>
+              <a:t>The Data Management Nightmare</a:t>
+            </a:r>
+          </a:p>
+        </p:txBody>
+      </p:sp>
+      <p:sp>
+        <p:nvSpPr>
+          <p:cNvPr id="5" name="Rectangle 4"/>
+          <p:cNvSpPr/>
+          <p:nvPr/>
+        </p:nvSpPr>
+        <p:spPr>
+          <a:xfrm>
+            <a:off x="5628229" y="6411524"/>
+            <a:ext cx="3866609" cy="276999"/>
+          </a:xfrm>
+          <a:prstGeom prst="rect">
+            <a:avLst/>
+          </a:prstGeom>
+        </p:spPr>
+        <p:txBody>
+          <a:bodyPr wrap="square">
+            <a:spAutoFit/>
+          </a:bodyPr>
+          <a:lstStyle/>
+          <a:p>
+            <a:pPr algn="r"/>
+            <a:r>
+              <a:rPr lang="en-US" sz="1200" dirty="0">
+                <a:solidFill>
+                  <a:prstClr val="black">
+                    <a:lumMod val="65000"/>
+                    <a:lumOff val="35000"/>
+                  </a:prstClr>
+                </a:solidFill>
+              </a:rPr>
+              <a:t>https://www.youtube.com/watch?v=N2zK3sAtr-4</a:t>
+            </a:r>
+          </a:p>
+        </p:txBody>
+      </p:sp>
+      <p:sp>
+        <p:nvSpPr>
+          <p:cNvPr id="6" name="TextBox 5"/>
+          <p:cNvSpPr txBox="1"/>
+          <p:nvPr/>
+        </p:nvSpPr>
+        <p:spPr>
+          <a:xfrm>
+            <a:off x="4390235" y="6176460"/>
+            <a:ext cx="5104603" cy="276999"/>
+          </a:xfrm>
+          <a:prstGeom prst="rect">
+            <a:avLst/>
+          </a:prstGeom>
+          <a:noFill/>
+        </p:spPr>
+        <p:txBody>
+          <a:bodyPr wrap="none" rtlCol="0">
+            <a:spAutoFit/>
+          </a:bodyPr>
+          <a:lstStyle/>
+          <a:p>
+            <a:pPr algn="r"/>
+            <a:r>
+              <a:rPr lang="en-US" sz="1200" dirty="0">
+                <a:solidFill>
+                  <a:prstClr val="black">
+                    <a:lumMod val="65000"/>
+                    <a:lumOff val="35000"/>
+                  </a:prstClr>
+                </a:solidFill>
+              </a:rPr>
+              <a:t>Karen Hanson, Alisa </a:t>
+            </a:r>
+            <a:r>
+              <a:rPr lang="en-US" sz="1200" dirty="0" err="1">
+                <a:solidFill>
+                  <a:prstClr val="black">
+                    <a:lumMod val="65000"/>
+                    <a:lumOff val="35000"/>
+                  </a:prstClr>
+                </a:solidFill>
+              </a:rPr>
+              <a:t>Surkis</a:t>
+            </a:r>
+            <a:r>
+              <a:rPr lang="en-US" sz="1200" dirty="0">
+                <a:solidFill>
+                  <a:prstClr val="black">
+                    <a:lumMod val="65000"/>
+                    <a:lumOff val="35000"/>
+                  </a:prstClr>
+                </a:solidFill>
+              </a:rPr>
+              <a:t>, and Karen </a:t>
+            </a:r>
+            <a:r>
+              <a:rPr lang="en-US" sz="1200" dirty="0" err="1">
+                <a:solidFill>
+                  <a:prstClr val="black">
+                    <a:lumMod val="65000"/>
+                    <a:lumOff val="35000"/>
+                  </a:prstClr>
+                </a:solidFill>
+              </a:rPr>
+              <a:t>Yacobucci</a:t>
+            </a:r>
+            <a:r>
+              <a:rPr lang="en-US" sz="1200" dirty="0">
+                <a:solidFill>
+                  <a:prstClr val="black">
+                    <a:lumMod val="65000"/>
+                    <a:lumOff val="35000"/>
+                  </a:prstClr>
+                </a:solidFill>
+              </a:rPr>
+              <a:t>, NYU Health Sciences Libraries</a:t>
+            </a:r>
+          </a:p>
+        </p:txBody>
+      </p:sp>
+      <p:pic>
+        <p:nvPicPr>
+          <p:cNvPr id="1123" name="ShockwaveFlash1"/>
+          <p:cNvPicPr preferRelativeResize="0">
+            <a:picLocks noChangeArrowheads="1" noChangeShapeType="1"/>
+          </p:cNvPicPr>
+          <p:nvPr/>
+        </p:nvPicPr>
+        <p:blipFill>
+          <a:blip r:embed="rId2" cstate="print">
+            <a:extLst>
+              <a:ext uri="{28A0092B-C50C-407E-A947-70E740481C1C}">
+                <a14:useLocalDpi xmlns:a14="http://schemas.microsoft.com/office/drawing/2010/main" val="0"/>
+              </a:ext>
+            </a:extLst>
+          </a:blip>
+          <a:srcRect/>
+          <a:stretch>
+            <a:fillRect/>
+          </a:stretch>
+        </p:blipFill>
+        <p:spPr bwMode="auto">
+          <a:xfrm>
+            <a:off x="2692400" y="1409700"/>
+            <a:ext cx="6794500" cy="4533900"/>
+          </a:xfrm>
+          <a:prstGeom prst="rect">
+            <a:avLst/>
+          </a:prstGeom>
+          <a:noFill/>
+          <a:ln>
+            <a:noFill/>
+          </a:ln>
+          <a:extLst>
+            <a:ext uri="{909E8E84-426E-40dd-AFC4-6F175D3DCCD1}">
+              <a14:hiddenFill xmlns="" xmlns:a14="http://schemas.microsoft.com/office/drawing/2010/main">
+                <a:noFill/>
+              </a14:hiddenFill>
+            </a:ext>
+            <a:ext uri="{91240B29-F687-4f45-9708-019B960494DF}">
+              <a14:hiddenLine xmlns="" xmlns:a14="http://schemas.microsoft.com/office/drawing/2010/main" w="9525">
+                <a:noFill/>
+                <a:miter lim="800000"/>
+                <a:headEnd/>
+                <a:tailEnd/>
+              </a14:hiddenLine>
+            </a:ext>
+          </a:extLst>
+        </p:spPr>
+      </p:pic>
+    </p:spTree>
+    <p:extLst>
+      <p:ext uri="{BB962C8B-B14F-4D97-AF65-F5344CB8AC3E}">
+        <p14:creationId xmlns:p14="http://schemas.microsoft.com/office/powerpoint/2010/main" val="2008817200"/>
+      </p:ext>
+    </p:extLst>
+  </p:cSld>
+  <p:clrMapOvr>
+    <a:masterClrMapping/>
+  </p:clrMapOvr>
+  <p:timing>
+    <p:tnLst>
+      <p:par>
+        <p:cTn id="1" dur="indefinite" restart="never" nodeType="tmRoot"/>
+      </p:par>
+    </p:tnLst>
+  </p:timing>
+</p:sld>
+</file>
+
+<file path=ppt/slides/slide20.xml><?xml version="1.0" encoding="utf-8"?>
+<p:sld xmlns:a="http://schemas.openxmlformats.org/drawingml/2006/main" xmlns:r="http://schemas.openxmlformats.org/officeDocument/2006/relationships" xmlns:p="http://schemas.openxmlformats.org/presentationml/2006/main">
+  <p:cSld>
+    <p:spTree>
+      <p:nvGrpSpPr>
+        <p:cNvPr id="1" name=""/>
+        <p:cNvGrpSpPr/>
+        <p:nvPr/>
+      </p:nvGrpSpPr>
+      <p:grpSpPr>
+        <a:xfrm>
+          <a:off x="0" y="0"/>
+          <a:ext cx="0" cy="0"/>
+          <a:chOff x="0" y="0"/>
+          <a:chExt cx="0" cy="0"/>
+        </a:xfrm>
+      </p:grpSpPr>
+      <p:sp>
+        <p:nvSpPr>
+          <p:cNvPr id="2" name="Title 1"/>
+          <p:cNvSpPr>
+            <a:spLocks noGrp="1"/>
+          </p:cNvSpPr>
+          <p:nvPr>
+            <p:ph type="title"/>
+          </p:nvPr>
+        </p:nvSpPr>
+        <p:spPr/>
+        <p:txBody>
+          <a:bodyPr/>
+          <a:lstStyle/>
+          <a:p>
+            <a:r>
+              <a:rPr lang="en-US" dirty="0" smtClean="0"/>
+              <a:t>The Case against Open Data</a:t>
+            </a:r>
+            <a:endParaRPr lang="en-US" dirty="0"/>
+          </a:p>
+        </p:txBody>
+      </p:sp>
+      <p:sp>
+        <p:nvSpPr>
+          <p:cNvPr id="3" name="Content Placeholder 2"/>
+          <p:cNvSpPr>
+            <a:spLocks noGrp="1"/>
+          </p:cNvSpPr>
+          <p:nvPr>
+            <p:ph idx="1"/>
+          </p:nvPr>
+        </p:nvSpPr>
+        <p:spPr/>
+        <p:txBody>
+          <a:bodyPr/>
+          <a:lstStyle/>
+          <a:p>
+            <a:r>
+              <a:rPr lang="en-US" dirty="0" smtClean="0"/>
+              <a:t>Privatization of public services (kind of like ‘free trade’)</a:t>
+            </a:r>
+          </a:p>
+          <a:p>
+            <a:pPr lvl="1"/>
+            <a:r>
+              <a:rPr lang="en-US" dirty="0" smtClean="0"/>
+              <a:t>Freely available data benefits big business!!!</a:t>
+            </a:r>
+          </a:p>
+          <a:p>
+            <a:pPr lvl="1"/>
+            <a:r>
+              <a:rPr lang="en-US" dirty="0" smtClean="0"/>
+              <a:t>Will open data be captured by big business in the guise of ‘transparency’</a:t>
+            </a:r>
+          </a:p>
+          <a:p>
+            <a:r>
+              <a:rPr lang="en-US" dirty="0" smtClean="0"/>
+              <a:t>Empowers the empowered even more</a:t>
+            </a:r>
+          </a:p>
+          <a:p>
+            <a:pPr lvl="1"/>
+            <a:r>
+              <a:rPr lang="en-US" dirty="0" smtClean="0"/>
+              <a:t>How is data used? For whose interests?</a:t>
+            </a:r>
+          </a:p>
+          <a:p>
+            <a:pPr lvl="1"/>
+            <a:r>
+              <a:rPr lang="en-US" dirty="0"/>
+              <a:t>Open Data can be captured (usually by a business interest) and repurposed outside of its original research </a:t>
+            </a:r>
+            <a:r>
+              <a:rPr lang="en-US" dirty="0" smtClean="0"/>
+              <a:t>context</a:t>
+            </a:r>
+          </a:p>
+          <a:p>
+            <a:r>
+              <a:rPr lang="en-US" dirty="0" smtClean="0"/>
+              <a:t>Lacks sustainability, scalability and usability</a:t>
+            </a:r>
+          </a:p>
+          <a:p>
+            <a:pPr lvl="1"/>
+            <a:r>
+              <a:rPr lang="en-US" dirty="0" smtClean="0"/>
+              <a:t>Often Open Data is promoted by volunteer time (enthusiasts, hackathons, </a:t>
+            </a:r>
+            <a:r>
+              <a:rPr lang="en-US" dirty="0" err="1" smtClean="0"/>
+              <a:t>etc</a:t>
+            </a:r>
+            <a:r>
+              <a:rPr lang="en-US" dirty="0" smtClean="0"/>
+              <a:t>)</a:t>
+            </a:r>
+          </a:p>
+          <a:p>
+            <a:pPr lvl="1"/>
+            <a:r>
+              <a:rPr lang="en-US" dirty="0" smtClean="0"/>
+              <a:t>Who will have the means to support this in the long run?</a:t>
+            </a:r>
+          </a:p>
+          <a:p>
+            <a:endParaRPr lang="en-US" dirty="0"/>
+          </a:p>
+        </p:txBody>
+      </p:sp>
+    </p:spTree>
+    <p:extLst>
+      <p:ext uri="{BB962C8B-B14F-4D97-AF65-F5344CB8AC3E}">
+        <p14:creationId xmlns:p14="http://schemas.microsoft.com/office/powerpoint/2010/main" val="3369452721"/>
+      </p:ext>
+    </p:extLst>
+  </p:cSld>
+  <p:clrMapOvr>
+    <a:masterClrMapping/>
+  </p:clrMapOvr>
+</p:sld>
+</file>
+
+<file path=ppt/slides/slide21.xml><?xml version="1.0" encoding="utf-8"?>
+<p:sld xmlns:a="http://schemas.openxmlformats.org/drawingml/2006/main" xmlns:r="http://schemas.openxmlformats.org/officeDocument/2006/relationships" xmlns:p="http://schemas.openxmlformats.org/presentationml/2006/main">
+  <p:cSld>
+    <p:spTree>
+      <p:nvGrpSpPr>
+        <p:cNvPr id="1" name=""/>
+        <p:cNvGrpSpPr/>
+        <p:nvPr/>
+      </p:nvGrpSpPr>
+      <p:grpSpPr>
+        <a:xfrm>
+          <a:off x="0" y="0"/>
+          <a:ext cx="0" cy="0"/>
+          <a:chOff x="0" y="0"/>
+          <a:chExt cx="0" cy="0"/>
+        </a:xfrm>
+      </p:grpSpPr>
+      <p:sp>
+        <p:nvSpPr>
+          <p:cNvPr id="2" name="Title 1"/>
+          <p:cNvSpPr>
+            <a:spLocks noGrp="1"/>
+          </p:cNvSpPr>
+          <p:nvPr>
+            <p:ph type="title"/>
+          </p:nvPr>
+        </p:nvSpPr>
+        <p:spPr/>
+        <p:txBody>
+          <a:bodyPr/>
+          <a:lstStyle/>
+          <a:p>
+            <a:r>
+              <a:rPr lang="en-US" dirty="0" smtClean="0"/>
+              <a:t>Intro to thinking about data management</a:t>
+            </a:r>
+            <a:endParaRPr lang="en-US" dirty="0"/>
+          </a:p>
+        </p:txBody>
+      </p:sp>
+      <p:sp>
+        <p:nvSpPr>
+          <p:cNvPr id="3" name="Content Placeholder 2"/>
+          <p:cNvSpPr>
+            <a:spLocks noGrp="1"/>
+          </p:cNvSpPr>
+          <p:nvPr>
+            <p:ph idx="1"/>
+          </p:nvPr>
+        </p:nvSpPr>
+        <p:spPr/>
+        <p:txBody>
+          <a:bodyPr/>
+          <a:lstStyle/>
+          <a:p>
+            <a:endParaRPr lang="en-US"/>
+          </a:p>
+        </p:txBody>
+      </p:sp>
+    </p:spTree>
+    <p:extLst>
+      <p:ext uri="{BB962C8B-B14F-4D97-AF65-F5344CB8AC3E}">
+        <p14:creationId xmlns:p14="http://schemas.microsoft.com/office/powerpoint/2010/main" val="2061105418"/>
+      </p:ext>
+    </p:extLst>
+  </p:cSld>
+  <p:clrMapOvr>
+    <a:masterClrMapping/>
+  </p:clrMapOvr>
+</p:sld>
+</file>
+
+<file path=ppt/slides/slide22.xml><?xml version="1.0" encoding="utf-8"?>
 <p:sld xmlns:a="http://schemas.openxmlformats.org/drawingml/2006/main" xmlns:r="http://schemas.openxmlformats.org/officeDocument/2006/relationships" xmlns:p="http://schemas.openxmlformats.org/presentationml/2006/main">
   <p:cSld>
     <p:spTree>
@@ -23304,7 +25157,7 @@
 </p:sld>
 </file>
 
-<file path=ppt/slides/slide13.xml><?xml version="1.0" encoding="utf-8"?>
+<file path=ppt/slides/slide23.xml><?xml version="1.0" encoding="utf-8"?>
 <p:sld xmlns:a="http://schemas.openxmlformats.org/drawingml/2006/main" xmlns:r="http://schemas.openxmlformats.org/officeDocument/2006/relationships" xmlns:p="http://schemas.openxmlformats.org/presentationml/2006/main">
   <p:cSld>
     <p:spTree>
@@ -23553,7 +25406,7 @@
 </p:sld>
 </file>
 
-<file path=ppt/slides/slide14.xml><?xml version="1.0" encoding="utf-8"?>
+<file path=ppt/slides/slide24.xml><?xml version="1.0" encoding="utf-8"?>
 <p:sld xmlns:a="http://schemas.openxmlformats.org/drawingml/2006/main" xmlns:r="http://schemas.openxmlformats.org/officeDocument/2006/relationships" xmlns:p="http://schemas.openxmlformats.org/presentationml/2006/main">
   <p:cSld>
     <p:spTree>
@@ -24495,7 +26348,7 @@
 </p:sld>
 </file>
 
-<file path=ppt/slides/slide15.xml><?xml version="1.0" encoding="utf-8"?>
+<file path=ppt/slides/slide25.xml><?xml version="1.0" encoding="utf-8"?>
 <p:sld xmlns:a="http://schemas.openxmlformats.org/drawingml/2006/main" xmlns:r="http://schemas.openxmlformats.org/officeDocument/2006/relationships" xmlns:p="http://schemas.openxmlformats.org/presentationml/2006/main">
   <p:cSld>
     <p:spTree>
@@ -24964,7 +26817,7 @@
 </p:sld>
 </file>
 
-<file path=ppt/slides/slide16.xml><?xml version="1.0" encoding="utf-8"?>
+<file path=ppt/slides/slide26.xml><?xml version="1.0" encoding="utf-8"?>
 <p:sld xmlns:a="http://schemas.openxmlformats.org/drawingml/2006/main" xmlns:r="http://schemas.openxmlformats.org/officeDocument/2006/relationships" xmlns:p="http://schemas.openxmlformats.org/presentationml/2006/main">
   <p:cSld>
     <p:spTree>
@@ -25459,7 +27312,7 @@
 </p:sld>
 </file>
 
-<file path=ppt/slides/slide17.xml><?xml version="1.0" encoding="utf-8"?>
+<file path=ppt/slides/slide27.xml><?xml version="1.0" encoding="utf-8"?>
 <p:sld xmlns:a="http://schemas.openxmlformats.org/drawingml/2006/main" xmlns:r="http://schemas.openxmlformats.org/officeDocument/2006/relationships" xmlns:p="http://schemas.openxmlformats.org/presentationml/2006/main">
   <p:cSld>
     <p:spTree>
@@ -25914,7 +27767,7 @@
 </p:sld>
 </file>
 
-<file path=ppt/slides/slide18.xml><?xml version="1.0" encoding="utf-8"?>
+<file path=ppt/slides/slide28.xml><?xml version="1.0" encoding="utf-8"?>
 <p:sld xmlns:a="http://schemas.openxmlformats.org/drawingml/2006/main" xmlns:r="http://schemas.openxmlformats.org/officeDocument/2006/relationships" xmlns:p="http://schemas.openxmlformats.org/presentationml/2006/main">
   <p:cSld>
     <p:spTree>
@@ -26329,7 +28182,7 @@
 </p:sld>
 </file>
 
-<file path=ppt/slides/slide19.xml><?xml version="1.0" encoding="utf-8"?>
+<file path=ppt/slides/slide29.xml><?xml version="1.0" encoding="utf-8"?>
 <p:sld xmlns:a="http://schemas.openxmlformats.org/drawingml/2006/main" xmlns:r="http://schemas.openxmlformats.org/officeDocument/2006/relationships" xmlns:p="http://schemas.openxmlformats.org/presentationml/2006/main">
   <p:cSld>
     <p:spTree>
@@ -26538,249 +28391,6 @@
   <p:clrMapOvr>
     <a:masterClrMapping/>
   </p:clrMapOvr>
-</p:sld>
-</file>
-
-<file path=ppt/slides/slide2.xml><?xml version="1.0" encoding="utf-8"?>
-<p:sld xmlns:a="http://schemas.openxmlformats.org/drawingml/2006/main" xmlns:r="http://schemas.openxmlformats.org/officeDocument/2006/relationships" xmlns:p="http://schemas.openxmlformats.org/presentationml/2006/main">
-  <p:cSld>
-    <p:spTree>
-      <p:nvGrpSpPr>
-        <p:cNvPr id="1" name=""/>
-        <p:cNvGrpSpPr/>
-        <p:nvPr/>
-      </p:nvGrpSpPr>
-      <p:grpSpPr>
-        <a:xfrm>
-          <a:off x="0" y="0"/>
-          <a:ext cx="0" cy="0"/>
-          <a:chOff x="0" y="0"/>
-          <a:chExt cx="0" cy="0"/>
-        </a:xfrm>
-      </p:grpSpPr>
-      <p:sp>
-        <p:nvSpPr>
-          <p:cNvPr id="2" name="Title 1"/>
-          <p:cNvSpPr>
-            <a:spLocks noGrp="1"/>
-          </p:cNvSpPr>
-          <p:nvPr>
-            <p:ph type="title"/>
-          </p:nvPr>
-        </p:nvSpPr>
-        <p:spPr/>
-        <p:txBody>
-          <a:bodyPr/>
-          <a:lstStyle/>
-          <a:p>
-            <a:r>
-              <a:rPr lang="en-US" dirty="0"/>
-              <a:t>The Data </a:t>
-            </a:r>
-            <a:r>
-              <a:rPr lang="en-US" dirty="0"/>
-              <a:t>M</a:t>
-            </a:r>
-            <a:r>
-              <a:rPr lang="en-US" dirty="0"/>
-              <a:t>anagement </a:t>
-            </a:r>
-            <a:r>
-              <a:rPr lang="en-US" dirty="0"/>
-              <a:t>N</a:t>
-            </a:r>
-            <a:r>
-              <a:rPr lang="en-US" dirty="0"/>
-              <a:t>ightmare</a:t>
-            </a:r>
-            <a:endParaRPr lang="en-US" dirty="0"/>
-          </a:p>
-        </p:txBody>
-      </p:sp>
-      <p:sp>
-        <p:nvSpPr>
-          <p:cNvPr id="5" name="Rectangle 4"/>
-          <p:cNvSpPr/>
-          <p:nvPr/>
-        </p:nvSpPr>
-        <p:spPr>
-          <a:xfrm>
-            <a:off x="5628229" y="6411524"/>
-            <a:ext cx="3866609" cy="276999"/>
-          </a:xfrm>
-          <a:prstGeom prst="rect">
-            <a:avLst/>
-          </a:prstGeom>
-        </p:spPr>
-        <p:txBody>
-          <a:bodyPr wrap="square">
-            <a:spAutoFit/>
-          </a:bodyPr>
-          <a:lstStyle/>
-          <a:p>
-            <a:pPr algn="r"/>
-            <a:r>
-              <a:rPr lang="en-US" sz="1200" dirty="0">
-                <a:solidFill>
-                  <a:prstClr val="black">
-                    <a:lumMod val="65000"/>
-                    <a:lumOff val="35000"/>
-                  </a:prstClr>
-                </a:solidFill>
-              </a:rPr>
-              <a:t>https://www.youtube.com/watch?v=N2zK3sAtr-4</a:t>
-            </a:r>
-          </a:p>
-        </p:txBody>
-      </p:sp>
-      <p:sp>
-        <p:nvSpPr>
-          <p:cNvPr id="6" name="TextBox 5"/>
-          <p:cNvSpPr txBox="1"/>
-          <p:nvPr/>
-        </p:nvSpPr>
-        <p:spPr>
-          <a:xfrm>
-            <a:off x="4390235" y="6176460"/>
-            <a:ext cx="5104603" cy="276999"/>
-          </a:xfrm>
-          <a:prstGeom prst="rect">
-            <a:avLst/>
-          </a:prstGeom>
-          <a:noFill/>
-        </p:spPr>
-        <p:txBody>
-          <a:bodyPr wrap="none" rtlCol="0">
-            <a:spAutoFit/>
-          </a:bodyPr>
-          <a:lstStyle/>
-          <a:p>
-            <a:pPr algn="r"/>
-            <a:r>
-              <a:rPr lang="en-US" sz="1200" dirty="0">
-                <a:solidFill>
-                  <a:prstClr val="black">
-                    <a:lumMod val="65000"/>
-                    <a:lumOff val="35000"/>
-                  </a:prstClr>
-                </a:solidFill>
-              </a:rPr>
-              <a:t>Karen Hanson, Alisa </a:t>
-            </a:r>
-            <a:r>
-              <a:rPr lang="en-US" sz="1200" dirty="0" err="1">
-                <a:solidFill>
-                  <a:prstClr val="black">
-                    <a:lumMod val="65000"/>
-                    <a:lumOff val="35000"/>
-                  </a:prstClr>
-                </a:solidFill>
-              </a:rPr>
-              <a:t>Surkis</a:t>
-            </a:r>
-            <a:r>
-              <a:rPr lang="en-US" sz="1200" dirty="0">
-                <a:solidFill>
-                  <a:prstClr val="black">
-                    <a:lumMod val="65000"/>
-                    <a:lumOff val="35000"/>
-                  </a:prstClr>
-                </a:solidFill>
-              </a:rPr>
-              <a:t>, and Karen </a:t>
-            </a:r>
-            <a:r>
-              <a:rPr lang="en-US" sz="1200" dirty="0" err="1">
-                <a:solidFill>
-                  <a:prstClr val="black">
-                    <a:lumMod val="65000"/>
-                    <a:lumOff val="35000"/>
-                  </a:prstClr>
-                </a:solidFill>
-              </a:rPr>
-              <a:t>Yacobucci</a:t>
-            </a:r>
-            <a:r>
-              <a:rPr lang="en-US" sz="1200" dirty="0">
-                <a:solidFill>
-                  <a:prstClr val="black">
-                    <a:lumMod val="65000"/>
-                    <a:lumOff val="35000"/>
-                  </a:prstClr>
-                </a:solidFill>
-              </a:rPr>
-              <a:t>, NYU Health Sciences Libraries</a:t>
-            </a:r>
-          </a:p>
-        </p:txBody>
-      </p:sp>
-      <p:pic>
-        <p:nvPicPr>
-          <p:cNvPr id="1123" name="ShockwaveFlash1"/>
-          <p:cNvPicPr preferRelativeResize="0">
-            <a:picLocks noChangeArrowheads="1" noChangeShapeType="1"/>
-          </p:cNvPicPr>
-          <p:nvPr/>
-        </p:nvPicPr>
-        <p:blipFill>
-          <a:blip r:embed="rId2" cstate="print">
-            <a:extLst>
-              <a:ext uri="{28A0092B-C50C-407E-A947-70E740481C1C}">
-                <a14:useLocalDpi xmlns:a14="http://schemas.microsoft.com/office/drawing/2010/main" val="0"/>
-              </a:ext>
-            </a:extLst>
-          </a:blip>
-          <a:srcRect/>
-          <a:stretch>
-            <a:fillRect/>
-          </a:stretch>
-        </p:blipFill>
-        <p:spPr bwMode="auto">
-          <a:xfrm>
-            <a:off x="2692400" y="1409700"/>
-            <a:ext cx="6794500" cy="4533900"/>
-          </a:xfrm>
-          <a:prstGeom prst="rect">
-            <a:avLst/>
-          </a:prstGeom>
-          <a:noFill/>
-          <a:ln>
-            <a:noFill/>
-          </a:ln>
-          <a:extLst>
-            <a:ext uri="{909E8E84-426E-40dd-AFC4-6F175D3DCCD1}">
-              <a14:hiddenFill xmlns:a14="http://schemas.microsoft.com/office/drawing/2010/main" xmlns="">
-                <a:noFill/>
-              </a14:hiddenFill>
-            </a:ext>
-            <a:ext uri="{91240B29-F687-4f45-9708-019B960494DF}">
-              <a14:hiddenLine xmlns:a14="http://schemas.microsoft.com/office/drawing/2010/main" xmlns="" w="9525">
-                <a:noFill/>
-                <a:miter lim="800000"/>
-                <a:headEnd/>
-                <a:tailEnd/>
-              </a14:hiddenLine>
-            </a:ext>
-          </a:extLst>
-        </p:spPr>
-      </p:pic>
-    </p:spTree>
-    <p:extLst>
-      <p:ext uri="{BB962C8B-B14F-4D97-AF65-F5344CB8AC3E}">
-        <p14:creationId xmlns:p14="http://schemas.microsoft.com/office/powerpoint/2010/main" val="2008817200"/>
-      </p:ext>
-    </p:extLst>
-  </p:cSld>
-  <p:clrMapOvr>
-    <a:masterClrMapping/>
-  </p:clrMapOvr>
-  <p:timing>
-    <p:tnLst>
-      <p:par>
-        <p:cTn id="1" dur="indefinite" restart="never" nodeType="tmRoot"/>
-      </p:par>
-    </p:tnLst>
-  </p:timing>
 </p:sld>
 </file>
 
@@ -27218,7 +28828,7 @@
           <a:noFill/>
           <a:extLst>
             <a:ext uri="{909E8E84-426E-40dd-AFC4-6F175D3DCCD1}">
-              <a14:hiddenFill xmlns="" xmlns:a14="http://schemas.microsoft.com/office/drawing/2010/main">
+              <a14:hiddenFill xmlns:a14="http://schemas.microsoft.com/office/drawing/2010/main" xmlns="">
                 <a:solidFill>
                   <a:srgbClr val="FFFFFF"/>
                 </a:solidFill>
@@ -28202,14 +29812,14 @@
           </a:ln>
           <a:extLst>
             <a:ext uri="{909E8E84-426E-40dd-AFC4-6F175D3DCCD1}">
-              <a14:hiddenFill xmlns="" xmlns:a14="http://schemas.microsoft.com/office/drawing/2010/main">
+              <a14:hiddenFill xmlns:a14="http://schemas.microsoft.com/office/drawing/2010/main" xmlns="">
                 <a:solidFill>
                   <a:srgbClr val="FFFFFF"/>
                 </a:solidFill>
               </a14:hiddenFill>
             </a:ext>
             <a:ext uri="{91240B29-F687-4f45-9708-019B960494DF}">
-              <a14:hiddenLine xmlns="" xmlns:a14="http://schemas.microsoft.com/office/drawing/2010/main" w="9525">
+              <a14:hiddenLine xmlns:a14="http://schemas.microsoft.com/office/drawing/2010/main" xmlns="" w="9525">
                 <a:solidFill>
                   <a:srgbClr val="000000"/>
                 </a:solidFill>
@@ -28243,14 +29853,14 @@
           </a:ln>
           <a:extLst>
             <a:ext uri="{909E8E84-426E-40dd-AFC4-6F175D3DCCD1}">
-              <a14:hiddenFill xmlns="" xmlns:a14="http://schemas.microsoft.com/office/drawing/2010/main">
+              <a14:hiddenFill xmlns:a14="http://schemas.microsoft.com/office/drawing/2010/main" xmlns="">
                 <a:solidFill>
                   <a:srgbClr val="FFFFFF"/>
                 </a:solidFill>
               </a14:hiddenFill>
             </a:ext>
             <a:ext uri="{91240B29-F687-4f45-9708-019B960494DF}">
-              <a14:hiddenLine xmlns="" xmlns:a14="http://schemas.microsoft.com/office/drawing/2010/main" w="9525">
+              <a14:hiddenLine xmlns:a14="http://schemas.microsoft.com/office/drawing/2010/main" xmlns="" w="9525">
                 <a:solidFill>
                   <a:srgbClr val="000000"/>
                 </a:solidFill>

</xml_diff>